<commit_message>
added leachate normalization calculations, PCA, RDA
</commit_message>
<xml_diff>
--- a/figures/NMR_Spectra_Pie.pptx
+++ b/figures/NMR_Spectra_Pie.pptx
@@ -104,6 +104,11 @@
       </a:defRPr>
     </a:lvl9pPr>
   </p:defaultTextStyle>
+  <p:extLst>
+    <p:ext uri="{EFAFB233-063F-42B5-8137-9DF3F51BA10A}">
+      <p15:sldGuideLst xmlns:p15="http://schemas.microsoft.com/office/powerpoint/2012/main"/>
+    </p:ext>
+  </p:extLst>
 </p:presentation>
 </file>
 
@@ -254,7 +259,7 @@
           <a:p>
             <a:fld id="{0B39565A-DAB0-1F47-9C95-8D653B6E3023}" type="datetimeFigureOut">
               <a:rPr lang="en-US" smtClean="0"/>
-              <a:t>11/27/23</a:t>
+              <a:t>1/12/24</a:t>
             </a:fld>
             <a:endParaRPr lang="en-US"/>
           </a:p>
@@ -452,7 +457,7 @@
           <a:p>
             <a:fld id="{0B39565A-DAB0-1F47-9C95-8D653B6E3023}" type="datetimeFigureOut">
               <a:rPr lang="en-US" smtClean="0"/>
-              <a:t>11/27/23</a:t>
+              <a:t>1/12/24</a:t>
             </a:fld>
             <a:endParaRPr lang="en-US"/>
           </a:p>
@@ -660,7 +665,7 @@
           <a:p>
             <a:fld id="{0B39565A-DAB0-1F47-9C95-8D653B6E3023}" type="datetimeFigureOut">
               <a:rPr lang="en-US" smtClean="0"/>
-              <a:t>11/27/23</a:t>
+              <a:t>1/12/24</a:t>
             </a:fld>
             <a:endParaRPr lang="en-US"/>
           </a:p>
@@ -858,7 +863,7 @@
           <a:p>
             <a:fld id="{0B39565A-DAB0-1F47-9C95-8D653B6E3023}" type="datetimeFigureOut">
               <a:rPr lang="en-US" smtClean="0"/>
-              <a:t>11/27/23</a:t>
+              <a:t>1/12/24</a:t>
             </a:fld>
             <a:endParaRPr lang="en-US"/>
           </a:p>
@@ -1133,7 +1138,7 @@
           <a:p>
             <a:fld id="{0B39565A-DAB0-1F47-9C95-8D653B6E3023}" type="datetimeFigureOut">
               <a:rPr lang="en-US" smtClean="0"/>
-              <a:t>11/27/23</a:t>
+              <a:t>1/12/24</a:t>
             </a:fld>
             <a:endParaRPr lang="en-US"/>
           </a:p>
@@ -1398,7 +1403,7 @@
           <a:p>
             <a:fld id="{0B39565A-DAB0-1F47-9C95-8D653B6E3023}" type="datetimeFigureOut">
               <a:rPr lang="en-US" smtClean="0"/>
-              <a:t>11/27/23</a:t>
+              <a:t>1/12/24</a:t>
             </a:fld>
             <a:endParaRPr lang="en-US"/>
           </a:p>
@@ -1810,7 +1815,7 @@
           <a:p>
             <a:fld id="{0B39565A-DAB0-1F47-9C95-8D653B6E3023}" type="datetimeFigureOut">
               <a:rPr lang="en-US" smtClean="0"/>
-              <a:t>11/27/23</a:t>
+              <a:t>1/12/24</a:t>
             </a:fld>
             <a:endParaRPr lang="en-US"/>
           </a:p>
@@ -1951,7 +1956,7 @@
           <a:p>
             <a:fld id="{0B39565A-DAB0-1F47-9C95-8D653B6E3023}" type="datetimeFigureOut">
               <a:rPr lang="en-US" smtClean="0"/>
-              <a:t>11/27/23</a:t>
+              <a:t>1/12/24</a:t>
             </a:fld>
             <a:endParaRPr lang="en-US"/>
           </a:p>
@@ -2064,7 +2069,7 @@
           <a:p>
             <a:fld id="{0B39565A-DAB0-1F47-9C95-8D653B6E3023}" type="datetimeFigureOut">
               <a:rPr lang="en-US" smtClean="0"/>
-              <a:t>11/27/23</a:t>
+              <a:t>1/12/24</a:t>
             </a:fld>
             <a:endParaRPr lang="en-US"/>
           </a:p>
@@ -2375,7 +2380,7 @@
           <a:p>
             <a:fld id="{0B39565A-DAB0-1F47-9C95-8D653B6E3023}" type="datetimeFigureOut">
               <a:rPr lang="en-US" smtClean="0"/>
-              <a:t>11/27/23</a:t>
+              <a:t>1/12/24</a:t>
             </a:fld>
             <a:endParaRPr lang="en-US"/>
           </a:p>
@@ -2663,7 +2668,7 @@
           <a:p>
             <a:fld id="{0B39565A-DAB0-1F47-9C95-8D653B6E3023}" type="datetimeFigureOut">
               <a:rPr lang="en-US" smtClean="0"/>
-              <a:t>11/27/23</a:t>
+              <a:t>1/12/24</a:t>
             </a:fld>
             <a:endParaRPr lang="en-US"/>
           </a:p>
@@ -2904,7 +2909,7 @@
           <a:p>
             <a:fld id="{0B39565A-DAB0-1F47-9C95-8D653B6E3023}" type="datetimeFigureOut">
               <a:rPr lang="en-US" smtClean="0"/>
-              <a:t>11/27/23</a:t>
+              <a:t>1/12/24</a:t>
             </a:fld>
             <a:endParaRPr lang="en-US"/>
           </a:p>
@@ -3618,12 +3623,246 @@
           </a:prstGeom>
         </p:spPr>
       </p:pic>
+      <p:sp>
+        <p:nvSpPr>
+          <p:cNvPr id="48" name="TextBox 47">
+            <a:extLst>
+              <a:ext uri="{FF2B5EF4-FFF2-40B4-BE49-F238E27FC236}">
+                <a16:creationId xmlns:a16="http://schemas.microsoft.com/office/drawing/2014/main" id="{735F11BB-1217-E52C-3439-DEFB9718B756}"/>
+              </a:ext>
+            </a:extLst>
+          </p:cNvPr>
+          <p:cNvSpPr txBox="1"/>
+          <p:nvPr/>
+        </p:nvSpPr>
+        <p:spPr>
+          <a:xfrm>
+            <a:off x="1121632" y="217085"/>
+            <a:ext cx="1941557" cy="369332"/>
+          </a:xfrm>
+          <a:prstGeom prst="rect">
+            <a:avLst/>
+          </a:prstGeom>
+          <a:noFill/>
+        </p:spPr>
+        <p:txBody>
+          <a:bodyPr wrap="none" rtlCol="0">
+            <a:spAutoFit/>
+          </a:bodyPr>
+          <a:lstStyle/>
+          <a:p>
+            <a:pPr algn="ctr"/>
+            <a:r>
+              <a:rPr lang="en-US" dirty="0">
+                <a:latin typeface="Arial" panose="020B0604020202020204" pitchFamily="34" charset="0"/>
+                <a:cs typeface="Arial" panose="020B0604020202020204" pitchFamily="34" charset="0"/>
+              </a:rPr>
+              <a:t>Douglas-fir forest</a:t>
+            </a:r>
+          </a:p>
+        </p:txBody>
+      </p:sp>
+      <p:sp>
+        <p:nvSpPr>
+          <p:cNvPr id="49" name="TextBox 48">
+            <a:extLst>
+              <a:ext uri="{FF2B5EF4-FFF2-40B4-BE49-F238E27FC236}">
+                <a16:creationId xmlns:a16="http://schemas.microsoft.com/office/drawing/2014/main" id="{7786B2DE-0FEE-F6DB-DE0E-87F6DB00FB4B}"/>
+              </a:ext>
+            </a:extLst>
+          </p:cNvPr>
+          <p:cNvSpPr txBox="1"/>
+          <p:nvPr/>
+        </p:nvSpPr>
+        <p:spPr>
+          <a:xfrm>
+            <a:off x="4488111" y="217085"/>
+            <a:ext cx="2377575" cy="369332"/>
+          </a:xfrm>
+          <a:prstGeom prst="rect">
+            <a:avLst/>
+          </a:prstGeom>
+          <a:noFill/>
+        </p:spPr>
+        <p:txBody>
+          <a:bodyPr wrap="none" rtlCol="0">
+            <a:spAutoFit/>
+          </a:bodyPr>
+          <a:lstStyle/>
+          <a:p>
+            <a:pPr algn="ctr"/>
+            <a:r>
+              <a:rPr lang="en-US" dirty="0">
+                <a:latin typeface="Arial" panose="020B0604020202020204" pitchFamily="34" charset="0"/>
+                <a:cs typeface="Arial" panose="020B0604020202020204" pitchFamily="34" charset="0"/>
+              </a:rPr>
+              <a:t>Sagebrush shrubland</a:t>
+            </a:r>
+          </a:p>
+        </p:txBody>
+      </p:sp>
+      <p:sp>
+        <p:nvSpPr>
+          <p:cNvPr id="50" name="TextBox 49">
+            <a:extLst>
+              <a:ext uri="{FF2B5EF4-FFF2-40B4-BE49-F238E27FC236}">
+                <a16:creationId xmlns:a16="http://schemas.microsoft.com/office/drawing/2014/main" id="{C9F1126E-C42D-946A-A581-6E5BAE306CB8}"/>
+              </a:ext>
+            </a:extLst>
+          </p:cNvPr>
+          <p:cNvSpPr txBox="1"/>
+          <p:nvPr/>
+        </p:nvSpPr>
+        <p:spPr>
+          <a:xfrm rot="16200000">
+            <a:off x="115930" y="5124446"/>
+            <a:ext cx="1083951" cy="338554"/>
+          </a:xfrm>
+          <a:prstGeom prst="rect">
+            <a:avLst/>
+          </a:prstGeom>
+          <a:noFill/>
+        </p:spPr>
+        <p:txBody>
+          <a:bodyPr wrap="none" rtlCol="0">
+            <a:spAutoFit/>
+          </a:bodyPr>
+          <a:lstStyle/>
+          <a:p>
+            <a:pPr algn="ctr"/>
+            <a:r>
+              <a:rPr lang="en-US" sz="1600" dirty="0">
+                <a:latin typeface="Arial" panose="020B0604020202020204" pitchFamily="34" charset="0"/>
+                <a:cs typeface="Arial" panose="020B0604020202020204" pitchFamily="34" charset="0"/>
+              </a:rPr>
+              <a:t>Unburned</a:t>
+            </a:r>
+          </a:p>
+        </p:txBody>
+      </p:sp>
+      <p:sp>
+        <p:nvSpPr>
+          <p:cNvPr id="51" name="TextBox 50">
+            <a:extLst>
+              <a:ext uri="{FF2B5EF4-FFF2-40B4-BE49-F238E27FC236}">
+                <a16:creationId xmlns:a16="http://schemas.microsoft.com/office/drawing/2014/main" id="{E1286FC1-F95B-024A-98D6-9487814B2A46}"/>
+              </a:ext>
+            </a:extLst>
+          </p:cNvPr>
+          <p:cNvSpPr txBox="1"/>
+          <p:nvPr/>
+        </p:nvSpPr>
+        <p:spPr>
+          <a:xfrm rot="16200000">
+            <a:off x="378020" y="3798974"/>
+            <a:ext cx="559770" cy="338554"/>
+          </a:xfrm>
+          <a:prstGeom prst="rect">
+            <a:avLst/>
+          </a:prstGeom>
+          <a:noFill/>
+        </p:spPr>
+        <p:txBody>
+          <a:bodyPr wrap="none" rtlCol="0">
+            <a:spAutoFit/>
+          </a:bodyPr>
+          <a:lstStyle/>
+          <a:p>
+            <a:pPr algn="ctr"/>
+            <a:r>
+              <a:rPr lang="en-US" sz="1600" dirty="0">
+                <a:latin typeface="Arial" panose="020B0604020202020204" pitchFamily="34" charset="0"/>
+                <a:cs typeface="Arial" panose="020B0604020202020204" pitchFamily="34" charset="0"/>
+              </a:rPr>
+              <a:t>Low</a:t>
+            </a:r>
+          </a:p>
+        </p:txBody>
+      </p:sp>
+      <p:sp>
+        <p:nvSpPr>
+          <p:cNvPr id="52" name="TextBox 51">
+            <a:extLst>
+              <a:ext uri="{FF2B5EF4-FFF2-40B4-BE49-F238E27FC236}">
+                <a16:creationId xmlns:a16="http://schemas.microsoft.com/office/drawing/2014/main" id="{13D0365D-DAB9-B7BB-BD49-3DD3654E54BE}"/>
+              </a:ext>
+            </a:extLst>
+          </p:cNvPr>
+          <p:cNvSpPr txBox="1"/>
+          <p:nvPr/>
+        </p:nvSpPr>
+        <p:spPr>
+          <a:xfrm rot="16200000">
+            <a:off x="131960" y="2487784"/>
+            <a:ext cx="1051891" cy="338554"/>
+          </a:xfrm>
+          <a:prstGeom prst="rect">
+            <a:avLst/>
+          </a:prstGeom>
+          <a:noFill/>
+        </p:spPr>
+        <p:txBody>
+          <a:bodyPr wrap="none" rtlCol="0">
+            <a:spAutoFit/>
+          </a:bodyPr>
+          <a:lstStyle/>
+          <a:p>
+            <a:pPr algn="ctr"/>
+            <a:r>
+              <a:rPr lang="en-US" sz="1600" dirty="0">
+                <a:latin typeface="Arial" panose="020B0604020202020204" pitchFamily="34" charset="0"/>
+                <a:cs typeface="Arial" panose="020B0604020202020204" pitchFamily="34" charset="0"/>
+              </a:rPr>
+              <a:t>Moderate</a:t>
+            </a:r>
+          </a:p>
+        </p:txBody>
+      </p:sp>
+      <p:sp>
+        <p:nvSpPr>
+          <p:cNvPr id="53" name="TextBox 52">
+            <a:extLst>
+              <a:ext uri="{FF2B5EF4-FFF2-40B4-BE49-F238E27FC236}">
+                <a16:creationId xmlns:a16="http://schemas.microsoft.com/office/drawing/2014/main" id="{41F0FECB-B0EA-7EF0-C853-EA3BC6A03DB0}"/>
+              </a:ext>
+            </a:extLst>
+          </p:cNvPr>
+          <p:cNvSpPr txBox="1"/>
+          <p:nvPr/>
+        </p:nvSpPr>
+        <p:spPr>
+          <a:xfrm rot="16200000">
+            <a:off x="355579" y="1162565"/>
+            <a:ext cx="604654" cy="338554"/>
+          </a:xfrm>
+          <a:prstGeom prst="rect">
+            <a:avLst/>
+          </a:prstGeom>
+          <a:noFill/>
+        </p:spPr>
+        <p:txBody>
+          <a:bodyPr wrap="none" rtlCol="0">
+            <a:spAutoFit/>
+          </a:bodyPr>
+          <a:lstStyle/>
+          <a:p>
+            <a:pPr algn="ctr"/>
+            <a:r>
+              <a:rPr lang="en-US" sz="1600" dirty="0">
+                <a:latin typeface="Arial" panose="020B0604020202020204" pitchFamily="34" charset="0"/>
+                <a:cs typeface="Arial" panose="020B0604020202020204" pitchFamily="34" charset="0"/>
+              </a:rPr>
+              <a:t>High</a:t>
+            </a:r>
+          </a:p>
+        </p:txBody>
+      </p:sp>
       <p:pic>
         <p:nvPicPr>
-          <p:cNvPr id="35" name="Picture 34">
-            <a:extLst>
-              <a:ext uri="{FF2B5EF4-FFF2-40B4-BE49-F238E27FC236}">
-                <a16:creationId xmlns:a16="http://schemas.microsoft.com/office/drawing/2014/main" id="{933C2050-875D-0A02-1029-4BC8F4FECA5B}"/>
+          <p:cNvPr id="3" name="Picture 2">
+            <a:extLst>
+              <a:ext uri="{FF2B5EF4-FFF2-40B4-BE49-F238E27FC236}">
+                <a16:creationId xmlns:a16="http://schemas.microsoft.com/office/drawing/2014/main" id="{1FA00118-E4EF-1E16-25E8-507B6EBA93F4}"/>
               </a:ext>
             </a:extLst>
           </p:cNvPr>
@@ -3640,7 +3879,7 @@
         </p:blipFill>
         <p:spPr>
           <a:xfrm>
-            <a:off x="2781794" y="4830417"/>
+            <a:off x="2778211" y="4961142"/>
             <a:ext cx="914400" cy="914400"/>
           </a:xfrm>
           <a:prstGeom prst="rect">
@@ -3650,10 +3889,10 @@
       </p:pic>
       <p:pic>
         <p:nvPicPr>
-          <p:cNvPr id="37" name="Picture 36">
-            <a:extLst>
-              <a:ext uri="{FF2B5EF4-FFF2-40B4-BE49-F238E27FC236}">
-                <a16:creationId xmlns:a16="http://schemas.microsoft.com/office/drawing/2014/main" id="{A12EF627-BD28-1EF6-F006-2D242EC32078}"/>
+          <p:cNvPr id="6" name="Picture 5">
+            <a:extLst>
+              <a:ext uri="{FF2B5EF4-FFF2-40B4-BE49-F238E27FC236}">
+                <a16:creationId xmlns:a16="http://schemas.microsoft.com/office/drawing/2014/main" id="{62AA728D-7E3E-C70B-15DE-B425B058CEE8}"/>
               </a:ext>
             </a:extLst>
           </p:cNvPr>
@@ -3670,7 +3909,7 @@
         </p:blipFill>
         <p:spPr>
           <a:xfrm>
-            <a:off x="2781794" y="3515140"/>
+            <a:off x="2778211" y="3630189"/>
             <a:ext cx="914400" cy="914400"/>
           </a:xfrm>
           <a:prstGeom prst="rect">
@@ -3680,10 +3919,10 @@
       </p:pic>
       <p:pic>
         <p:nvPicPr>
-          <p:cNvPr id="39" name="Picture 38">
-            <a:extLst>
-              <a:ext uri="{FF2B5EF4-FFF2-40B4-BE49-F238E27FC236}">
-                <a16:creationId xmlns:a16="http://schemas.microsoft.com/office/drawing/2014/main" id="{DE037BA0-E924-BE2A-07A8-C27CF5C19B48}"/>
+          <p:cNvPr id="13" name="Picture 12">
+            <a:extLst>
+              <a:ext uri="{FF2B5EF4-FFF2-40B4-BE49-F238E27FC236}">
+                <a16:creationId xmlns:a16="http://schemas.microsoft.com/office/drawing/2014/main" id="{AA317987-CEF2-EA99-9098-6CE5F5BE76CE}"/>
               </a:ext>
             </a:extLst>
           </p:cNvPr>
@@ -3700,7 +3939,7 @@
         </p:blipFill>
         <p:spPr>
           <a:xfrm>
-            <a:off x="2781794" y="2199862"/>
+            <a:off x="2778211" y="2299237"/>
             <a:ext cx="914400" cy="914400"/>
           </a:xfrm>
           <a:prstGeom prst="rect">
@@ -3710,10 +3949,10 @@
       </p:pic>
       <p:pic>
         <p:nvPicPr>
-          <p:cNvPr id="41" name="Picture 40">
-            <a:extLst>
-              <a:ext uri="{FF2B5EF4-FFF2-40B4-BE49-F238E27FC236}">
-                <a16:creationId xmlns:a16="http://schemas.microsoft.com/office/drawing/2014/main" id="{C22B69C3-51A6-F855-AE27-D1725CF42259}"/>
+          <p:cNvPr id="16" name="Picture 15">
+            <a:extLst>
+              <a:ext uri="{FF2B5EF4-FFF2-40B4-BE49-F238E27FC236}">
+                <a16:creationId xmlns:a16="http://schemas.microsoft.com/office/drawing/2014/main" id="{269F773F-A93F-E941-FF32-846BDC829CF7}"/>
               </a:ext>
             </a:extLst>
           </p:cNvPr>
@@ -3730,7 +3969,7 @@
         </p:blipFill>
         <p:spPr>
           <a:xfrm>
-            <a:off x="2781794" y="884584"/>
+            <a:off x="2778211" y="968285"/>
             <a:ext cx="914400" cy="914400"/>
           </a:xfrm>
           <a:prstGeom prst="rect">
@@ -3740,10 +3979,10 @@
       </p:pic>
       <p:pic>
         <p:nvPicPr>
-          <p:cNvPr id="43" name="Picture 42">
-            <a:extLst>
-              <a:ext uri="{FF2B5EF4-FFF2-40B4-BE49-F238E27FC236}">
-                <a16:creationId xmlns:a16="http://schemas.microsoft.com/office/drawing/2014/main" id="{643ECA14-1961-543D-3D0D-EBFF0B532BC6}"/>
+          <p:cNvPr id="18" name="Picture 17">
+            <a:extLst>
+              <a:ext uri="{FF2B5EF4-FFF2-40B4-BE49-F238E27FC236}">
+                <a16:creationId xmlns:a16="http://schemas.microsoft.com/office/drawing/2014/main" id="{2F551121-D007-E1FD-423D-819C784F8718}"/>
               </a:ext>
             </a:extLst>
           </p:cNvPr>
@@ -3760,7 +3999,7 @@
         </p:blipFill>
         <p:spPr>
           <a:xfrm>
-            <a:off x="6162261" y="4833710"/>
+            <a:off x="6146468" y="4931081"/>
             <a:ext cx="914400" cy="914400"/>
           </a:xfrm>
           <a:prstGeom prst="rect">
@@ -3770,10 +4009,10 @@
       </p:pic>
       <p:pic>
         <p:nvPicPr>
-          <p:cNvPr id="45" name="Picture 44">
-            <a:extLst>
-              <a:ext uri="{FF2B5EF4-FFF2-40B4-BE49-F238E27FC236}">
-                <a16:creationId xmlns:a16="http://schemas.microsoft.com/office/drawing/2014/main" id="{0D408E68-E836-A943-ECD0-F999A1F6FAEE}"/>
+          <p:cNvPr id="20" name="Picture 19">
+            <a:extLst>
+              <a:ext uri="{FF2B5EF4-FFF2-40B4-BE49-F238E27FC236}">
+                <a16:creationId xmlns:a16="http://schemas.microsoft.com/office/drawing/2014/main" id="{3CE0DD4A-13FB-2239-ADF5-DF8933161C97}"/>
               </a:ext>
             </a:extLst>
           </p:cNvPr>
@@ -3790,7 +4029,7 @@
         </p:blipFill>
         <p:spPr>
           <a:xfrm>
-            <a:off x="6162261" y="3515140"/>
+            <a:off x="6146468" y="3602488"/>
             <a:ext cx="914400" cy="914400"/>
           </a:xfrm>
           <a:prstGeom prst="rect">
@@ -3800,10 +4039,10 @@
       </p:pic>
       <p:pic>
         <p:nvPicPr>
-          <p:cNvPr id="47" name="Picture 46">
-            <a:extLst>
-              <a:ext uri="{FF2B5EF4-FFF2-40B4-BE49-F238E27FC236}">
-                <a16:creationId xmlns:a16="http://schemas.microsoft.com/office/drawing/2014/main" id="{C2946CEE-DC1F-D8E7-FE98-32768B15B241}"/>
+          <p:cNvPr id="22" name="Picture 21">
+            <a:extLst>
+              <a:ext uri="{FF2B5EF4-FFF2-40B4-BE49-F238E27FC236}">
+                <a16:creationId xmlns:a16="http://schemas.microsoft.com/office/drawing/2014/main" id="{4A7B4CBD-F7EE-AFFC-7684-ADCE4275971C}"/>
               </a:ext>
             </a:extLst>
           </p:cNvPr>
@@ -3820,7 +4059,7 @@
         </p:blipFill>
         <p:spPr>
           <a:xfrm>
-            <a:off x="6162261" y="2203191"/>
+            <a:off x="6146468" y="2273894"/>
             <a:ext cx="914400" cy="914400"/>
           </a:xfrm>
           <a:prstGeom prst="rect">
@@ -3828,240 +4067,6 @@
           </a:prstGeom>
         </p:spPr>
       </p:pic>
-      <p:sp>
-        <p:nvSpPr>
-          <p:cNvPr id="48" name="TextBox 47">
-            <a:extLst>
-              <a:ext uri="{FF2B5EF4-FFF2-40B4-BE49-F238E27FC236}">
-                <a16:creationId xmlns:a16="http://schemas.microsoft.com/office/drawing/2014/main" id="{735F11BB-1217-E52C-3439-DEFB9718B756}"/>
-              </a:ext>
-            </a:extLst>
-          </p:cNvPr>
-          <p:cNvSpPr txBox="1"/>
-          <p:nvPr/>
-        </p:nvSpPr>
-        <p:spPr>
-          <a:xfrm>
-            <a:off x="1083160" y="217085"/>
-            <a:ext cx="2018501" cy="369332"/>
-          </a:xfrm>
-          <a:prstGeom prst="rect">
-            <a:avLst/>
-          </a:prstGeom>
-          <a:noFill/>
-        </p:spPr>
-        <p:txBody>
-          <a:bodyPr wrap="none" rtlCol="0">
-            <a:spAutoFit/>
-          </a:bodyPr>
-          <a:lstStyle/>
-          <a:p>
-            <a:pPr algn="ctr"/>
-            <a:r>
-              <a:rPr lang="en-US" dirty="0">
-                <a:latin typeface="Arial" panose="020B0604020202020204" pitchFamily="34" charset="0"/>
-                <a:cs typeface="Arial" panose="020B0604020202020204" pitchFamily="34" charset="0"/>
-              </a:rPr>
-              <a:t>Douglas-fir Forest</a:t>
-            </a:r>
-          </a:p>
-        </p:txBody>
-      </p:sp>
-      <p:sp>
-        <p:nvSpPr>
-          <p:cNvPr id="49" name="TextBox 48">
-            <a:extLst>
-              <a:ext uri="{FF2B5EF4-FFF2-40B4-BE49-F238E27FC236}">
-                <a16:creationId xmlns:a16="http://schemas.microsoft.com/office/drawing/2014/main" id="{7786B2DE-0FEE-F6DB-DE0E-87F6DB00FB4B}"/>
-              </a:ext>
-            </a:extLst>
-          </p:cNvPr>
-          <p:cNvSpPr txBox="1"/>
-          <p:nvPr/>
-        </p:nvSpPr>
-        <p:spPr>
-          <a:xfrm>
-            <a:off x="4827947" y="217085"/>
-            <a:ext cx="1697901" cy="369332"/>
-          </a:xfrm>
-          <a:prstGeom prst="rect">
-            <a:avLst/>
-          </a:prstGeom>
-          <a:noFill/>
-        </p:spPr>
-        <p:txBody>
-          <a:bodyPr wrap="none" rtlCol="0">
-            <a:spAutoFit/>
-          </a:bodyPr>
-          <a:lstStyle/>
-          <a:p>
-            <a:pPr algn="ctr"/>
-            <a:r>
-              <a:rPr lang="en-US" dirty="0">
-                <a:latin typeface="Arial" panose="020B0604020202020204" pitchFamily="34" charset="0"/>
-                <a:cs typeface="Arial" panose="020B0604020202020204" pitchFamily="34" charset="0"/>
-              </a:rPr>
-              <a:t>Big Sagebrush</a:t>
-            </a:r>
-          </a:p>
-        </p:txBody>
-      </p:sp>
-      <p:sp>
-        <p:nvSpPr>
-          <p:cNvPr id="50" name="TextBox 49">
-            <a:extLst>
-              <a:ext uri="{FF2B5EF4-FFF2-40B4-BE49-F238E27FC236}">
-                <a16:creationId xmlns:a16="http://schemas.microsoft.com/office/drawing/2014/main" id="{C9F1126E-C42D-946A-A581-6E5BAE306CB8}"/>
-              </a:ext>
-            </a:extLst>
-          </p:cNvPr>
-          <p:cNvSpPr txBox="1"/>
-          <p:nvPr/>
-        </p:nvSpPr>
-        <p:spPr>
-          <a:xfrm rot="16200000">
-            <a:off x="115930" y="5124446"/>
-            <a:ext cx="1083951" cy="338554"/>
-          </a:xfrm>
-          <a:prstGeom prst="rect">
-            <a:avLst/>
-          </a:prstGeom>
-          <a:noFill/>
-        </p:spPr>
-        <p:txBody>
-          <a:bodyPr wrap="none" rtlCol="0">
-            <a:spAutoFit/>
-          </a:bodyPr>
-          <a:lstStyle/>
-          <a:p>
-            <a:pPr algn="ctr"/>
-            <a:r>
-              <a:rPr lang="en-US" sz="1600" dirty="0">
-                <a:latin typeface="Arial" panose="020B0604020202020204" pitchFamily="34" charset="0"/>
-                <a:cs typeface="Arial" panose="020B0604020202020204" pitchFamily="34" charset="0"/>
-              </a:rPr>
-              <a:t>Unburned</a:t>
-            </a:r>
-          </a:p>
-        </p:txBody>
-      </p:sp>
-      <p:sp>
-        <p:nvSpPr>
-          <p:cNvPr id="51" name="TextBox 50">
-            <a:extLst>
-              <a:ext uri="{FF2B5EF4-FFF2-40B4-BE49-F238E27FC236}">
-                <a16:creationId xmlns:a16="http://schemas.microsoft.com/office/drawing/2014/main" id="{E1286FC1-F95B-024A-98D6-9487814B2A46}"/>
-              </a:ext>
-            </a:extLst>
-          </p:cNvPr>
-          <p:cNvSpPr txBox="1"/>
-          <p:nvPr/>
-        </p:nvSpPr>
-        <p:spPr>
-          <a:xfrm rot="16200000">
-            <a:off x="378020" y="3798974"/>
-            <a:ext cx="559770" cy="338554"/>
-          </a:xfrm>
-          <a:prstGeom prst="rect">
-            <a:avLst/>
-          </a:prstGeom>
-          <a:noFill/>
-        </p:spPr>
-        <p:txBody>
-          <a:bodyPr wrap="none" rtlCol="0">
-            <a:spAutoFit/>
-          </a:bodyPr>
-          <a:lstStyle/>
-          <a:p>
-            <a:pPr algn="ctr"/>
-            <a:r>
-              <a:rPr lang="en-US" sz="1600" dirty="0">
-                <a:latin typeface="Arial" panose="020B0604020202020204" pitchFamily="34" charset="0"/>
-                <a:cs typeface="Arial" panose="020B0604020202020204" pitchFamily="34" charset="0"/>
-              </a:rPr>
-              <a:t>Low</a:t>
-            </a:r>
-          </a:p>
-        </p:txBody>
-      </p:sp>
-      <p:sp>
-        <p:nvSpPr>
-          <p:cNvPr id="52" name="TextBox 51">
-            <a:extLst>
-              <a:ext uri="{FF2B5EF4-FFF2-40B4-BE49-F238E27FC236}">
-                <a16:creationId xmlns:a16="http://schemas.microsoft.com/office/drawing/2014/main" id="{13D0365D-DAB9-B7BB-BD49-3DD3654E54BE}"/>
-              </a:ext>
-            </a:extLst>
-          </p:cNvPr>
-          <p:cNvSpPr txBox="1"/>
-          <p:nvPr/>
-        </p:nvSpPr>
-        <p:spPr>
-          <a:xfrm rot="16200000">
-            <a:off x="131960" y="2487784"/>
-            <a:ext cx="1051891" cy="338554"/>
-          </a:xfrm>
-          <a:prstGeom prst="rect">
-            <a:avLst/>
-          </a:prstGeom>
-          <a:noFill/>
-        </p:spPr>
-        <p:txBody>
-          <a:bodyPr wrap="none" rtlCol="0">
-            <a:spAutoFit/>
-          </a:bodyPr>
-          <a:lstStyle/>
-          <a:p>
-            <a:pPr algn="ctr"/>
-            <a:r>
-              <a:rPr lang="en-US" sz="1600" dirty="0">
-                <a:latin typeface="Arial" panose="020B0604020202020204" pitchFamily="34" charset="0"/>
-                <a:cs typeface="Arial" panose="020B0604020202020204" pitchFamily="34" charset="0"/>
-              </a:rPr>
-              <a:t>Moderate</a:t>
-            </a:r>
-          </a:p>
-        </p:txBody>
-      </p:sp>
-      <p:sp>
-        <p:nvSpPr>
-          <p:cNvPr id="53" name="TextBox 52">
-            <a:extLst>
-              <a:ext uri="{FF2B5EF4-FFF2-40B4-BE49-F238E27FC236}">
-                <a16:creationId xmlns:a16="http://schemas.microsoft.com/office/drawing/2014/main" id="{41F0FECB-B0EA-7EF0-C853-EA3BC6A03DB0}"/>
-              </a:ext>
-            </a:extLst>
-          </p:cNvPr>
-          <p:cNvSpPr txBox="1"/>
-          <p:nvPr/>
-        </p:nvSpPr>
-        <p:spPr>
-          <a:xfrm rot="16200000">
-            <a:off x="355579" y="1162565"/>
-            <a:ext cx="604654" cy="338554"/>
-          </a:xfrm>
-          <a:prstGeom prst="rect">
-            <a:avLst/>
-          </a:prstGeom>
-          <a:noFill/>
-        </p:spPr>
-        <p:txBody>
-          <a:bodyPr wrap="none" rtlCol="0">
-            <a:spAutoFit/>
-          </a:bodyPr>
-          <a:lstStyle/>
-          <a:p>
-            <a:pPr algn="ctr"/>
-            <a:r>
-              <a:rPr lang="en-US" sz="1600" dirty="0">
-                <a:latin typeface="Arial" panose="020B0604020202020204" pitchFamily="34" charset="0"/>
-                <a:cs typeface="Arial" panose="020B0604020202020204" pitchFamily="34" charset="0"/>
-              </a:rPr>
-              <a:t>High</a:t>
-            </a:r>
-          </a:p>
-        </p:txBody>
-      </p:sp>
     </p:spTree>
     <p:extLst>
       <p:ext uri="{BB962C8B-B14F-4D97-AF65-F5344CB8AC3E}">

</xml_diff>

<commit_message>
updated colors to NMR and XANES pie charts
</commit_message>
<xml_diff>
--- a/figures/NMR_Spectra_Pie.pptx
+++ b/figures/NMR_Spectra_Pie.pptx
@@ -259,7 +259,7 @@
           <a:p>
             <a:fld id="{0B39565A-DAB0-1F47-9C95-8D653B6E3023}" type="datetimeFigureOut">
               <a:rPr lang="en-US" smtClean="0"/>
-              <a:t>5/16/24</a:t>
+              <a:t>7/4/24</a:t>
             </a:fld>
             <a:endParaRPr lang="en-US"/>
           </a:p>
@@ -457,7 +457,7 @@
           <a:p>
             <a:fld id="{0B39565A-DAB0-1F47-9C95-8D653B6E3023}" type="datetimeFigureOut">
               <a:rPr lang="en-US" smtClean="0"/>
-              <a:t>5/16/24</a:t>
+              <a:t>7/4/24</a:t>
             </a:fld>
             <a:endParaRPr lang="en-US"/>
           </a:p>
@@ -665,7 +665,7 @@
           <a:p>
             <a:fld id="{0B39565A-DAB0-1F47-9C95-8D653B6E3023}" type="datetimeFigureOut">
               <a:rPr lang="en-US" smtClean="0"/>
-              <a:t>5/16/24</a:t>
+              <a:t>7/4/24</a:t>
             </a:fld>
             <a:endParaRPr lang="en-US"/>
           </a:p>
@@ -863,7 +863,7 @@
           <a:p>
             <a:fld id="{0B39565A-DAB0-1F47-9C95-8D653B6E3023}" type="datetimeFigureOut">
               <a:rPr lang="en-US" smtClean="0"/>
-              <a:t>5/16/24</a:t>
+              <a:t>7/4/24</a:t>
             </a:fld>
             <a:endParaRPr lang="en-US"/>
           </a:p>
@@ -1138,7 +1138,7 @@
           <a:p>
             <a:fld id="{0B39565A-DAB0-1F47-9C95-8D653B6E3023}" type="datetimeFigureOut">
               <a:rPr lang="en-US" smtClean="0"/>
-              <a:t>5/16/24</a:t>
+              <a:t>7/4/24</a:t>
             </a:fld>
             <a:endParaRPr lang="en-US"/>
           </a:p>
@@ -1403,7 +1403,7 @@
           <a:p>
             <a:fld id="{0B39565A-DAB0-1F47-9C95-8D653B6E3023}" type="datetimeFigureOut">
               <a:rPr lang="en-US" smtClean="0"/>
-              <a:t>5/16/24</a:t>
+              <a:t>7/4/24</a:t>
             </a:fld>
             <a:endParaRPr lang="en-US"/>
           </a:p>
@@ -1815,7 +1815,7 @@
           <a:p>
             <a:fld id="{0B39565A-DAB0-1F47-9C95-8D653B6E3023}" type="datetimeFigureOut">
               <a:rPr lang="en-US" smtClean="0"/>
-              <a:t>5/16/24</a:t>
+              <a:t>7/4/24</a:t>
             </a:fld>
             <a:endParaRPr lang="en-US"/>
           </a:p>
@@ -1956,7 +1956,7 @@
           <a:p>
             <a:fld id="{0B39565A-DAB0-1F47-9C95-8D653B6E3023}" type="datetimeFigureOut">
               <a:rPr lang="en-US" smtClean="0"/>
-              <a:t>5/16/24</a:t>
+              <a:t>7/4/24</a:t>
             </a:fld>
             <a:endParaRPr lang="en-US"/>
           </a:p>
@@ -2069,7 +2069,7 @@
           <a:p>
             <a:fld id="{0B39565A-DAB0-1F47-9C95-8D653B6E3023}" type="datetimeFigureOut">
               <a:rPr lang="en-US" smtClean="0"/>
-              <a:t>5/16/24</a:t>
+              <a:t>7/4/24</a:t>
             </a:fld>
             <a:endParaRPr lang="en-US"/>
           </a:p>
@@ -2380,7 +2380,7 @@
           <a:p>
             <a:fld id="{0B39565A-DAB0-1F47-9C95-8D653B6E3023}" type="datetimeFigureOut">
               <a:rPr lang="en-US" smtClean="0"/>
-              <a:t>5/16/24</a:t>
+              <a:t>7/4/24</a:t>
             </a:fld>
             <a:endParaRPr lang="en-US"/>
           </a:p>
@@ -2668,7 +2668,7 @@
           <a:p>
             <a:fld id="{0B39565A-DAB0-1F47-9C95-8D653B6E3023}" type="datetimeFigureOut">
               <a:rPr lang="en-US" smtClean="0"/>
-              <a:t>5/16/24</a:t>
+              <a:t>7/4/24</a:t>
             </a:fld>
             <a:endParaRPr lang="en-US"/>
           </a:p>
@@ -2909,7 +2909,7 @@
           <a:p>
             <a:fld id="{0B39565A-DAB0-1F47-9C95-8D653B6E3023}" type="datetimeFigureOut">
               <a:rPr lang="en-US" smtClean="0"/>
-              <a:t>5/16/24</a:t>
+              <a:t>7/4/24</a:t>
             </a:fld>
             <a:endParaRPr lang="en-US"/>
           </a:p>
@@ -3492,58 +3492,6 @@
       </p:sp>
       <p:sp>
         <p:nvSpPr>
-          <p:cNvPr id="10" name="Rectangle 9">
-            <a:extLst>
-              <a:ext uri="{FF2B5EF4-FFF2-40B4-BE49-F238E27FC236}">
-                <a16:creationId xmlns:a16="http://schemas.microsoft.com/office/drawing/2014/main" id="{0A7B02B0-F772-31A9-97FE-B15338C9615C}"/>
-              </a:ext>
-            </a:extLst>
-          </p:cNvPr>
-          <p:cNvSpPr/>
-          <p:nvPr/>
-        </p:nvSpPr>
-        <p:spPr>
-          <a:xfrm rot="5400000">
-            <a:off x="4946372" y="-331298"/>
-            <a:ext cx="1461053" cy="3018184"/>
-          </a:xfrm>
-          <a:prstGeom prst="rect">
-            <a:avLst/>
-          </a:prstGeom>
-          <a:solidFill>
-            <a:schemeClr val="bg1"/>
-          </a:solidFill>
-          <a:ln>
-            <a:noFill/>
-          </a:ln>
-        </p:spPr>
-        <p:style>
-          <a:lnRef idx="2">
-            <a:schemeClr val="accent1">
-              <a:shade val="15000"/>
-            </a:schemeClr>
-          </a:lnRef>
-          <a:fillRef idx="1">
-            <a:schemeClr val="accent1"/>
-          </a:fillRef>
-          <a:effectRef idx="0">
-            <a:schemeClr val="accent1"/>
-          </a:effectRef>
-          <a:fontRef idx="minor">
-            <a:schemeClr val="lt1"/>
-          </a:fontRef>
-        </p:style>
-        <p:txBody>
-          <a:bodyPr rtlCol="0" anchor="ctr"/>
-          <a:lstStyle/>
-          <a:p>
-            <a:pPr algn="ctr"/>
-            <a:endParaRPr lang="en-US"/>
-          </a:p>
-        </p:txBody>
-      </p:sp>
-      <p:sp>
-        <p:nvSpPr>
           <p:cNvPr id="11" name="Rectangle 10">
             <a:extLst>
               <a:ext uri="{FF2B5EF4-FFF2-40B4-BE49-F238E27FC236}">
@@ -3594,35 +3542,6 @@
           </a:p>
         </p:txBody>
       </p:sp>
-      <p:pic>
-        <p:nvPicPr>
-          <p:cNvPr id="15" name="Picture 14">
-            <a:extLst>
-              <a:ext uri="{FF2B5EF4-FFF2-40B4-BE49-F238E27FC236}">
-                <a16:creationId xmlns:a16="http://schemas.microsoft.com/office/drawing/2014/main" id="{131B10A7-31E7-9141-2A7A-CA41C6C1FB1C}"/>
-              </a:ext>
-            </a:extLst>
-          </p:cNvPr>
-          <p:cNvPicPr>
-            <a:picLocks noChangeAspect="1"/>
-          </p:cNvPicPr>
-          <p:nvPr/>
-        </p:nvPicPr>
-        <p:blipFill rotWithShape="1">
-          <a:blip r:embed="rId4"/>
-          <a:srcRect l="62832" t="32070" r="12789" b="17929"/>
-          <a:stretch/>
-        </p:blipFill>
-        <p:spPr>
-          <a:xfrm>
-            <a:off x="5949688" y="675861"/>
-            <a:ext cx="1279373" cy="1311966"/>
-          </a:xfrm>
-          <a:prstGeom prst="rect">
-            <a:avLst/>
-          </a:prstGeom>
-        </p:spPr>
-      </p:pic>
       <p:sp>
         <p:nvSpPr>
           <p:cNvPr id="48" name="TextBox 47">
@@ -3745,7 +3664,19 @@
                 <a:latin typeface="Arial" panose="020B0604020202020204" pitchFamily="34" charset="0"/>
                 <a:cs typeface="Arial" panose="020B0604020202020204" pitchFamily="34" charset="0"/>
               </a:rPr>
-              <a:t>(25</a:t>
+              <a:t>(25 </a:t>
+            </a:r>
+            <a:r>
+              <a:rPr lang="en-US" sz="1400" kern="0" dirty="0">
+                <a:solidFill>
+                  <a:srgbClr val="000000"/>
+                </a:solidFill>
+                <a:effectLst/>
+                <a:latin typeface="Arial" panose="020B0604020202020204" pitchFamily="34" charset="0"/>
+                <a:ea typeface="Times New Roman" panose="02020603050405020304" pitchFamily="18" charset="0"/>
+                <a:cs typeface="Arial" panose="020B0604020202020204" pitchFamily="34" charset="0"/>
+              </a:rPr>
+              <a:t>°C</a:t>
             </a:r>
             <a:r>
               <a:rPr lang="en-US" sz="1400" dirty="0">
@@ -3776,8 +3707,8 @@
         </p:nvSpPr>
         <p:spPr>
           <a:xfrm rot="16200000">
-            <a:off x="298634" y="3630683"/>
-            <a:ext cx="958917" cy="584775"/>
+            <a:off x="172799" y="3630683"/>
+            <a:ext cx="1210588" cy="584775"/>
           </a:xfrm>
           <a:prstGeom prst="rect">
             <a:avLst/>
@@ -3806,7 +3737,19 @@
                 <a:latin typeface="Arial" panose="020B0604020202020204" pitchFamily="34" charset="0"/>
                 <a:cs typeface="Arial" panose="020B0604020202020204" pitchFamily="34" charset="0"/>
               </a:rPr>
-              <a:t>(295-627</a:t>
+              <a:t>(295-627 </a:t>
+            </a:r>
+            <a:r>
+              <a:rPr lang="en-US" sz="1400" kern="0" dirty="0">
+                <a:solidFill>
+                  <a:srgbClr val="000000"/>
+                </a:solidFill>
+                <a:effectLst/>
+                <a:latin typeface="Arial" panose="020B0604020202020204" pitchFamily="34" charset="0"/>
+                <a:ea typeface="Times New Roman" panose="02020603050405020304" pitchFamily="18" charset="0"/>
+                <a:cs typeface="Arial" panose="020B0604020202020204" pitchFamily="34" charset="0"/>
+              </a:rPr>
+              <a:t>°C</a:t>
             </a:r>
             <a:r>
               <a:rPr lang="en-US" sz="1400" dirty="0">
@@ -3837,8 +3780,8 @@
         </p:nvSpPr>
         <p:spPr>
           <a:xfrm rot="16200000">
-            <a:off x="198447" y="2282156"/>
-            <a:ext cx="1159292" cy="584775"/>
+            <a:off x="172799" y="2282156"/>
+            <a:ext cx="1210588" cy="584775"/>
           </a:xfrm>
           <a:prstGeom prst="rect">
             <a:avLst/>
@@ -3867,7 +3810,19 @@
                 <a:latin typeface="Arial" panose="020B0604020202020204" pitchFamily="34" charset="0"/>
                 <a:cs typeface="Arial" panose="020B0604020202020204" pitchFamily="34" charset="0"/>
               </a:rPr>
-              <a:t>(589-757</a:t>
+              <a:t>(589-757 </a:t>
+            </a:r>
+            <a:r>
+              <a:rPr lang="en-US" sz="1400" kern="0" dirty="0">
+                <a:solidFill>
+                  <a:srgbClr val="000000"/>
+                </a:solidFill>
+                <a:effectLst/>
+                <a:latin typeface="Arial" panose="020B0604020202020204" pitchFamily="34" charset="0"/>
+                <a:ea typeface="Times New Roman" panose="02020603050405020304" pitchFamily="18" charset="0"/>
+                <a:cs typeface="Arial" panose="020B0604020202020204" pitchFamily="34" charset="0"/>
+              </a:rPr>
+              <a:t>°C</a:t>
             </a:r>
             <a:r>
               <a:rPr lang="en-US" sz="1400" dirty="0">
@@ -3898,8 +3853,8 @@
         </p:nvSpPr>
         <p:spPr>
           <a:xfrm rot="16200000">
-            <a:off x="306584" y="957179"/>
-            <a:ext cx="958917" cy="584775"/>
+            <a:off x="180749" y="957179"/>
+            <a:ext cx="1210588" cy="584775"/>
           </a:xfrm>
           <a:prstGeom prst="rect">
             <a:avLst/>
@@ -3928,7 +3883,19 @@
                 <a:latin typeface="Arial" panose="020B0604020202020204" pitchFamily="34" charset="0"/>
                 <a:cs typeface="Arial" panose="020B0604020202020204" pitchFamily="34" charset="0"/>
               </a:rPr>
-              <a:t>(589-757</a:t>
+              <a:t>(589-757 </a:t>
+            </a:r>
+            <a:r>
+              <a:rPr lang="en-US" sz="1400" kern="0" dirty="0">
+                <a:solidFill>
+                  <a:srgbClr val="000000"/>
+                </a:solidFill>
+                <a:effectLst/>
+                <a:latin typeface="Arial" panose="020B0604020202020204" pitchFamily="34" charset="0"/>
+                <a:ea typeface="Times New Roman" panose="02020603050405020304" pitchFamily="18" charset="0"/>
+                <a:cs typeface="Arial" panose="020B0604020202020204" pitchFamily="34" charset="0"/>
+              </a:rPr>
+              <a:t>°C</a:t>
             </a:r>
             <a:r>
               <a:rPr lang="en-US" sz="1400" dirty="0">
@@ -4128,12 +4095,207 @@
           </a:p>
         </p:txBody>
       </p:sp>
+      <p:grpSp>
+        <p:nvGrpSpPr>
+          <p:cNvPr id="59" name="Group 58">
+            <a:extLst>
+              <a:ext uri="{FF2B5EF4-FFF2-40B4-BE49-F238E27FC236}">
+                <a16:creationId xmlns:a16="http://schemas.microsoft.com/office/drawing/2014/main" id="{9FC03E21-37F2-00A1-5DC4-FA845A8D20A2}"/>
+              </a:ext>
+            </a:extLst>
+          </p:cNvPr>
+          <p:cNvGrpSpPr/>
+          <p:nvPr/>
+        </p:nvGrpSpPr>
+        <p:grpSpPr>
+          <a:xfrm>
+            <a:off x="2858828" y="951453"/>
+            <a:ext cx="914400" cy="4938262"/>
+            <a:chOff x="1887553" y="874644"/>
+            <a:chExt cx="914400" cy="4938262"/>
+          </a:xfrm>
+        </p:grpSpPr>
+        <p:pic>
+          <p:nvPicPr>
+            <p:cNvPr id="46" name="Picture 45">
+              <a:extLst>
+                <a:ext uri="{FF2B5EF4-FFF2-40B4-BE49-F238E27FC236}">
+                  <a16:creationId xmlns:a16="http://schemas.microsoft.com/office/drawing/2014/main" id="{B3388357-7FE0-B78C-E472-CA3AD6364178}"/>
+                </a:ext>
+              </a:extLst>
+            </p:cNvPr>
+            <p:cNvPicPr>
+              <a:picLocks noChangeAspect="1"/>
+            </p:cNvPicPr>
+            <p:nvPr/>
+          </p:nvPicPr>
+          <p:blipFill>
+            <a:blip r:embed="rId4"/>
+            <a:stretch>
+              <a:fillRect/>
+            </a:stretch>
+          </p:blipFill>
+          <p:spPr>
+            <a:xfrm>
+              <a:off x="1887553" y="874644"/>
+              <a:ext cx="914400" cy="914400"/>
+            </a:xfrm>
+            <a:prstGeom prst="rect">
+              <a:avLst/>
+            </a:prstGeom>
+          </p:spPr>
+        </p:pic>
+        <p:pic>
+          <p:nvPicPr>
+            <p:cNvPr id="50" name="Picture 49">
+              <a:extLst>
+                <a:ext uri="{FF2B5EF4-FFF2-40B4-BE49-F238E27FC236}">
+                  <a16:creationId xmlns:a16="http://schemas.microsoft.com/office/drawing/2014/main" id="{7CF88706-7817-29F2-DB16-B24A92A465EF}"/>
+                </a:ext>
+              </a:extLst>
+            </p:cNvPr>
+            <p:cNvPicPr>
+              <a:picLocks noChangeAspect="1"/>
+            </p:cNvPicPr>
+            <p:nvPr/>
+          </p:nvPicPr>
+          <p:blipFill>
+            <a:blip r:embed="rId5"/>
+            <a:stretch>
+              <a:fillRect/>
+            </a:stretch>
+          </p:blipFill>
+          <p:spPr>
+            <a:xfrm>
+              <a:off x="1887553" y="2215931"/>
+              <a:ext cx="914400" cy="914400"/>
+            </a:xfrm>
+            <a:prstGeom prst="rect">
+              <a:avLst/>
+            </a:prstGeom>
+          </p:spPr>
+        </p:pic>
+        <p:pic>
+          <p:nvPicPr>
+            <p:cNvPr id="52" name="Picture 51">
+              <a:extLst>
+                <a:ext uri="{FF2B5EF4-FFF2-40B4-BE49-F238E27FC236}">
+                  <a16:creationId xmlns:a16="http://schemas.microsoft.com/office/drawing/2014/main" id="{DA958D0E-9DE7-66E7-971F-7E3E6176BAAA}"/>
+                </a:ext>
+              </a:extLst>
+            </p:cNvPr>
+            <p:cNvPicPr>
+              <a:picLocks noChangeAspect="1"/>
+            </p:cNvPicPr>
+            <p:nvPr/>
+          </p:nvPicPr>
+          <p:blipFill>
+            <a:blip r:embed="rId6"/>
+            <a:stretch>
+              <a:fillRect/>
+            </a:stretch>
+          </p:blipFill>
+          <p:spPr>
+            <a:xfrm>
+              <a:off x="1887553" y="3557218"/>
+              <a:ext cx="914400" cy="914400"/>
+            </a:xfrm>
+            <a:prstGeom prst="rect">
+              <a:avLst/>
+            </a:prstGeom>
+          </p:spPr>
+        </p:pic>
+        <p:pic>
+          <p:nvPicPr>
+            <p:cNvPr id="54" name="Picture 53">
+              <a:extLst>
+                <a:ext uri="{FF2B5EF4-FFF2-40B4-BE49-F238E27FC236}">
+                  <a16:creationId xmlns:a16="http://schemas.microsoft.com/office/drawing/2014/main" id="{BBA207A6-C4A3-754D-2053-CB1F500E8583}"/>
+                </a:ext>
+              </a:extLst>
+            </p:cNvPr>
+            <p:cNvPicPr>
+              <a:picLocks noChangeAspect="1"/>
+            </p:cNvPicPr>
+            <p:nvPr/>
+          </p:nvPicPr>
+          <p:blipFill>
+            <a:blip r:embed="rId7"/>
+            <a:stretch>
+              <a:fillRect/>
+            </a:stretch>
+          </p:blipFill>
+          <p:spPr>
+            <a:xfrm>
+              <a:off x="1887553" y="4898506"/>
+              <a:ext cx="914400" cy="914400"/>
+            </a:xfrm>
+            <a:prstGeom prst="rect">
+              <a:avLst/>
+            </a:prstGeom>
+          </p:spPr>
+        </p:pic>
+      </p:grpSp>
+      <p:sp>
+        <p:nvSpPr>
+          <p:cNvPr id="61" name="Rectangle 60">
+            <a:extLst>
+              <a:ext uri="{FF2B5EF4-FFF2-40B4-BE49-F238E27FC236}">
+                <a16:creationId xmlns:a16="http://schemas.microsoft.com/office/drawing/2014/main" id="{D64EDCE7-C61A-6522-086F-B6D888E7D8D2}"/>
+              </a:ext>
+            </a:extLst>
+          </p:cNvPr>
+          <p:cNvSpPr/>
+          <p:nvPr/>
+        </p:nvSpPr>
+        <p:spPr>
+          <a:xfrm>
+            <a:off x="4000500" y="586417"/>
+            <a:ext cx="2983230" cy="1408480"/>
+          </a:xfrm>
+          <a:prstGeom prst="rect">
+            <a:avLst/>
+          </a:prstGeom>
+          <a:solidFill>
+            <a:schemeClr val="bg1"/>
+          </a:solidFill>
+          <a:ln>
+            <a:solidFill>
+              <a:schemeClr val="bg1"/>
+            </a:solidFill>
+          </a:ln>
+        </p:spPr>
+        <p:style>
+          <a:lnRef idx="2">
+            <a:schemeClr val="accent1">
+              <a:shade val="15000"/>
+            </a:schemeClr>
+          </a:lnRef>
+          <a:fillRef idx="1">
+            <a:schemeClr val="accent1"/>
+          </a:fillRef>
+          <a:effectRef idx="0">
+            <a:schemeClr val="accent1"/>
+          </a:effectRef>
+          <a:fontRef idx="minor">
+            <a:schemeClr val="lt1"/>
+          </a:fontRef>
+        </p:style>
+        <p:txBody>
+          <a:bodyPr rtlCol="0" anchor="ctr"/>
+          <a:lstStyle/>
+          <a:p>
+            <a:pPr algn="ctr"/>
+            <a:endParaRPr lang="en-US"/>
+          </a:p>
+        </p:txBody>
+      </p:sp>
       <p:pic>
         <p:nvPicPr>
-          <p:cNvPr id="24" name="Picture 23">
-            <a:extLst>
-              <a:ext uri="{FF2B5EF4-FFF2-40B4-BE49-F238E27FC236}">
-                <a16:creationId xmlns:a16="http://schemas.microsoft.com/office/drawing/2014/main" id="{1A3DC9A2-359D-ACC5-A1CE-7E5EE6BA6724}"/>
+          <p:cNvPr id="56" name="Picture 55">
+            <a:extLst>
+              <a:ext uri="{FF2B5EF4-FFF2-40B4-BE49-F238E27FC236}">
+                <a16:creationId xmlns:a16="http://schemas.microsoft.com/office/drawing/2014/main" id="{3FB3F7E7-CE5C-FDBF-5B27-F07BBB38AD9E}"/>
               </a:ext>
             </a:extLst>
           </p:cNvPr>
@@ -4142,202 +4304,132 @@
           </p:cNvPicPr>
           <p:nvPr/>
         </p:nvPicPr>
-        <p:blipFill>
-          <a:blip r:embed="rId5"/>
-          <a:stretch>
-            <a:fillRect/>
-          </a:stretch>
+        <p:blipFill rotWithShape="1">
+          <a:blip r:embed="rId8"/>
+          <a:srcRect l="64176"/>
+          <a:stretch/>
         </p:blipFill>
         <p:spPr>
           <a:xfrm>
-            <a:off x="6161105" y="2239790"/>
-            <a:ext cx="914400" cy="914400"/>
+            <a:off x="5938753" y="280211"/>
+            <a:ext cx="1562520" cy="2180833"/>
           </a:xfrm>
           <a:prstGeom prst="rect">
             <a:avLst/>
           </a:prstGeom>
         </p:spPr>
       </p:pic>
-      <p:pic>
-        <p:nvPicPr>
-          <p:cNvPr id="26" name="Picture 25">
-            <a:extLst>
-              <a:ext uri="{FF2B5EF4-FFF2-40B4-BE49-F238E27FC236}">
-                <a16:creationId xmlns:a16="http://schemas.microsoft.com/office/drawing/2014/main" id="{DA433CFC-BDF0-C4F9-7593-CF187B07910F}"/>
-              </a:ext>
-            </a:extLst>
-          </p:cNvPr>
-          <p:cNvPicPr>
-            <a:picLocks noChangeAspect="1"/>
-          </p:cNvPicPr>
+      <p:grpSp>
+        <p:nvGrpSpPr>
+          <p:cNvPr id="60" name="Group 59">
+            <a:extLst>
+              <a:ext uri="{FF2B5EF4-FFF2-40B4-BE49-F238E27FC236}">
+                <a16:creationId xmlns:a16="http://schemas.microsoft.com/office/drawing/2014/main" id="{100AFA01-7225-6B7C-8BF0-CAA463AE3527}"/>
+              </a:ext>
+            </a:extLst>
+          </p:cNvPr>
+          <p:cNvGrpSpPr/>
           <p:nvPr/>
-        </p:nvPicPr>
-        <p:blipFill>
-          <a:blip r:embed="rId6"/>
-          <a:stretch>
-            <a:fillRect/>
-          </a:stretch>
-        </p:blipFill>
-        <p:spPr>
+        </p:nvGrpSpPr>
+        <p:grpSpPr>
           <a:xfrm>
-            <a:off x="6161105" y="3557218"/>
-            <a:ext cx="914400" cy="914400"/>
+            <a:off x="6209565" y="2292740"/>
+            <a:ext cx="914400" cy="3549256"/>
+            <a:chOff x="5148686" y="2239790"/>
+            <a:chExt cx="914400" cy="3549256"/>
           </a:xfrm>
-          <a:prstGeom prst="rect">
-            <a:avLst/>
-          </a:prstGeom>
-        </p:spPr>
-      </p:pic>
-      <p:pic>
-        <p:nvPicPr>
-          <p:cNvPr id="28" name="Picture 27">
-            <a:extLst>
-              <a:ext uri="{FF2B5EF4-FFF2-40B4-BE49-F238E27FC236}">
-                <a16:creationId xmlns:a16="http://schemas.microsoft.com/office/drawing/2014/main" id="{985C3985-C29E-60FB-D17B-3707378BD6F0}"/>
-              </a:ext>
-            </a:extLst>
-          </p:cNvPr>
-          <p:cNvPicPr>
-            <a:picLocks noChangeAspect="1"/>
-          </p:cNvPicPr>
-          <p:nvPr/>
-        </p:nvPicPr>
-        <p:blipFill>
-          <a:blip r:embed="rId7"/>
-          <a:stretch>
-            <a:fillRect/>
-          </a:stretch>
-        </p:blipFill>
-        <p:spPr>
-          <a:xfrm>
-            <a:off x="6161105" y="4874646"/>
-            <a:ext cx="914400" cy="914400"/>
-          </a:xfrm>
-          <a:prstGeom prst="rect">
-            <a:avLst/>
-          </a:prstGeom>
-        </p:spPr>
-      </p:pic>
-      <p:pic>
-        <p:nvPicPr>
-          <p:cNvPr id="30" name="Picture 29">
-            <a:extLst>
-              <a:ext uri="{FF2B5EF4-FFF2-40B4-BE49-F238E27FC236}">
-                <a16:creationId xmlns:a16="http://schemas.microsoft.com/office/drawing/2014/main" id="{713E70A5-F4B6-37DE-DF5D-168E7A8C2C4A}"/>
-              </a:ext>
-            </a:extLst>
-          </p:cNvPr>
-          <p:cNvPicPr>
-            <a:picLocks noChangeAspect="1"/>
-          </p:cNvPicPr>
-          <p:nvPr/>
-        </p:nvPicPr>
-        <p:blipFill>
-          <a:blip r:embed="rId8"/>
-          <a:stretch>
-            <a:fillRect/>
-          </a:stretch>
-        </p:blipFill>
-        <p:spPr>
-          <a:xfrm>
-            <a:off x="2766953" y="874644"/>
-            <a:ext cx="914400" cy="914400"/>
-          </a:xfrm>
-          <a:prstGeom prst="rect">
-            <a:avLst/>
-          </a:prstGeom>
-        </p:spPr>
-      </p:pic>
-      <p:pic>
-        <p:nvPicPr>
-          <p:cNvPr id="32" name="Picture 31">
-            <a:extLst>
-              <a:ext uri="{FF2B5EF4-FFF2-40B4-BE49-F238E27FC236}">
-                <a16:creationId xmlns:a16="http://schemas.microsoft.com/office/drawing/2014/main" id="{A1E18E20-EA2C-F033-9385-857FCA7CADFA}"/>
-              </a:ext>
-            </a:extLst>
-          </p:cNvPr>
-          <p:cNvPicPr>
-            <a:picLocks noChangeAspect="1"/>
-          </p:cNvPicPr>
-          <p:nvPr/>
-        </p:nvPicPr>
-        <p:blipFill>
-          <a:blip r:embed="rId9"/>
-          <a:stretch>
-            <a:fillRect/>
-          </a:stretch>
-        </p:blipFill>
-        <p:spPr>
-          <a:xfrm>
-            <a:off x="2766953" y="2215931"/>
-            <a:ext cx="914400" cy="914400"/>
-          </a:xfrm>
-          <a:prstGeom prst="rect">
-            <a:avLst/>
-          </a:prstGeom>
-        </p:spPr>
-      </p:pic>
-      <p:pic>
-        <p:nvPicPr>
-          <p:cNvPr id="34" name="Picture 33">
-            <a:extLst>
-              <a:ext uri="{FF2B5EF4-FFF2-40B4-BE49-F238E27FC236}">
-                <a16:creationId xmlns:a16="http://schemas.microsoft.com/office/drawing/2014/main" id="{1D2A452D-A211-FC23-4BC3-B4FB0EDEB42A}"/>
-              </a:ext>
-            </a:extLst>
-          </p:cNvPr>
-          <p:cNvPicPr>
-            <a:picLocks noChangeAspect="1"/>
-          </p:cNvPicPr>
-          <p:nvPr/>
-        </p:nvPicPr>
-        <p:blipFill>
-          <a:blip r:embed="rId10"/>
-          <a:stretch>
-            <a:fillRect/>
-          </a:stretch>
-        </p:blipFill>
-        <p:spPr>
-          <a:xfrm>
-            <a:off x="2766953" y="3557218"/>
-            <a:ext cx="914400" cy="914400"/>
-          </a:xfrm>
-          <a:prstGeom prst="rect">
-            <a:avLst/>
-          </a:prstGeom>
-        </p:spPr>
-      </p:pic>
-      <p:pic>
-        <p:nvPicPr>
-          <p:cNvPr id="36" name="Picture 35">
-            <a:extLst>
-              <a:ext uri="{FF2B5EF4-FFF2-40B4-BE49-F238E27FC236}">
-                <a16:creationId xmlns:a16="http://schemas.microsoft.com/office/drawing/2014/main" id="{73239A4F-2AD9-0128-9F56-8DAEC837C8F7}"/>
-              </a:ext>
-            </a:extLst>
-          </p:cNvPr>
-          <p:cNvPicPr>
-            <a:picLocks noChangeAspect="1"/>
-          </p:cNvPicPr>
-          <p:nvPr/>
-        </p:nvPicPr>
-        <p:blipFill>
-          <a:blip r:embed="rId11"/>
-          <a:stretch>
-            <a:fillRect/>
-          </a:stretch>
-        </p:blipFill>
-        <p:spPr>
-          <a:xfrm>
-            <a:off x="2766953" y="4898506"/>
-            <a:ext cx="914400" cy="914400"/>
-          </a:xfrm>
-          <a:prstGeom prst="rect">
-            <a:avLst/>
-          </a:prstGeom>
-        </p:spPr>
-      </p:pic>
+        </p:grpSpPr>
+        <p:pic>
+          <p:nvPicPr>
+            <p:cNvPr id="42" name="Picture 41">
+              <a:extLst>
+                <a:ext uri="{FF2B5EF4-FFF2-40B4-BE49-F238E27FC236}">
+                  <a16:creationId xmlns:a16="http://schemas.microsoft.com/office/drawing/2014/main" id="{B96BB28A-7A2B-07AD-3923-1EE9E3D2A439}"/>
+                </a:ext>
+              </a:extLst>
+            </p:cNvPr>
+            <p:cNvPicPr>
+              <a:picLocks noChangeAspect="1"/>
+            </p:cNvPicPr>
+            <p:nvPr/>
+          </p:nvPicPr>
+          <p:blipFill>
+            <a:blip r:embed="rId9"/>
+            <a:stretch>
+              <a:fillRect/>
+            </a:stretch>
+          </p:blipFill>
+          <p:spPr>
+            <a:xfrm>
+              <a:off x="5148686" y="3557218"/>
+              <a:ext cx="914400" cy="914400"/>
+            </a:xfrm>
+            <a:prstGeom prst="rect">
+              <a:avLst/>
+            </a:prstGeom>
+          </p:spPr>
+        </p:pic>
+        <p:pic>
+          <p:nvPicPr>
+            <p:cNvPr id="44" name="Picture 43">
+              <a:extLst>
+                <a:ext uri="{FF2B5EF4-FFF2-40B4-BE49-F238E27FC236}">
+                  <a16:creationId xmlns:a16="http://schemas.microsoft.com/office/drawing/2014/main" id="{FC559ED0-DD89-269D-8BEC-F64C2D9A6B81}"/>
+                </a:ext>
+              </a:extLst>
+            </p:cNvPr>
+            <p:cNvPicPr>
+              <a:picLocks noChangeAspect="1"/>
+            </p:cNvPicPr>
+            <p:nvPr/>
+          </p:nvPicPr>
+          <p:blipFill>
+            <a:blip r:embed="rId10"/>
+            <a:stretch>
+              <a:fillRect/>
+            </a:stretch>
+          </p:blipFill>
+          <p:spPr>
+            <a:xfrm>
+              <a:off x="5148686" y="4874646"/>
+              <a:ext cx="914400" cy="914400"/>
+            </a:xfrm>
+            <a:prstGeom prst="rect">
+              <a:avLst/>
+            </a:prstGeom>
+          </p:spPr>
+        </p:pic>
+        <p:pic>
+          <p:nvPicPr>
+            <p:cNvPr id="58" name="Picture 57">
+              <a:extLst>
+                <a:ext uri="{FF2B5EF4-FFF2-40B4-BE49-F238E27FC236}">
+                  <a16:creationId xmlns:a16="http://schemas.microsoft.com/office/drawing/2014/main" id="{8D79DFE4-DA3A-E5F3-0AF9-16D1DB3707FE}"/>
+                </a:ext>
+              </a:extLst>
+            </p:cNvPr>
+            <p:cNvPicPr>
+              <a:picLocks noChangeAspect="1"/>
+            </p:cNvPicPr>
+            <p:nvPr/>
+          </p:nvPicPr>
+          <p:blipFill>
+            <a:blip r:embed="rId11"/>
+            <a:stretch>
+              <a:fillRect/>
+            </a:stretch>
+          </p:blipFill>
+          <p:spPr>
+            <a:xfrm>
+              <a:off x="5148686" y="2239790"/>
+              <a:ext cx="914400" cy="914400"/>
+            </a:xfrm>
+            <a:prstGeom prst="rect">
+              <a:avLst/>
+            </a:prstGeom>
+          </p:spPr>
+        </p:pic>
+      </p:grpSp>
     </p:spTree>
     <p:extLst>
       <p:ext uri="{BB962C8B-B14F-4D97-AF65-F5344CB8AC3E}">

</xml_diff>